<commit_message>
added a modification for figure 1
</commit_message>
<xml_diff>
--- a/Data/sgRNA/Figure1/Figure 1 new version 0227.pptx
+++ b/Data/sgRNA/Figure1/Figure 1 new version 0227.pptx
@@ -106,6 +106,22 @@
       </a:defRPr>
     </a:lvl9pPr>
   </p:defaultTextStyle>
+  <p:extLst>
+    <p:ext uri="{EFAFB233-063F-42B5-8137-9DF3F51BA10A}">
+      <p15:sldGuideLst xmlns:p15="http://schemas.microsoft.com/office/powerpoint/2012/main">
+        <p15:guide id="1" orient="horz" pos="2160" userDrawn="1">
+          <p15:clr>
+            <a:srgbClr val="A4A3A4"/>
+          </p15:clr>
+        </p15:guide>
+        <p15:guide id="2" pos="3840" userDrawn="1">
+          <p15:clr>
+            <a:srgbClr val="A4A3A4"/>
+          </p15:clr>
+        </p15:guide>
+      </p15:sldGuideLst>
+    </p:ext>
+  </p:extLst>
 </p:presentation>
 </file>
 
@@ -3081,7 +3097,7 @@
       <p:grpSpPr/>
       <p:pic>
         <p:nvPicPr>
-          <p:cNvPr id="139" name="Picture 138" descr="000066"/>
+          <p:cNvPr id="2" name="Picture 1" descr="methylatedgreen"/>
           <p:cNvPicPr>
             <a:picLocks noChangeAspect="1"/>
           </p:cNvPicPr>
@@ -3095,6 +3111,30 @@
         </p:blipFill>
         <p:spPr>
           <a:xfrm>
+            <a:off x="225425" y="2559050"/>
+            <a:ext cx="1527810" cy="944245"/>
+          </a:xfrm>
+          <a:prstGeom prst="rect">
+            <a:avLst/>
+          </a:prstGeom>
+        </p:spPr>
+      </p:pic>
+      <p:pic>
+        <p:nvPicPr>
+          <p:cNvPr id="139" name="Picture 138" descr="000066"/>
+          <p:cNvPicPr>
+            <a:picLocks noChangeAspect="1"/>
+          </p:cNvPicPr>
+          <p:nvPr/>
+        </p:nvPicPr>
+        <p:blipFill>
+          <a:blip r:embed="rId2"/>
+          <a:stretch>
+            <a:fillRect/>
+          </a:stretch>
+        </p:blipFill>
+        <p:spPr>
+          <a:xfrm>
             <a:off x="225425" y="5790565"/>
             <a:ext cx="1538605" cy="950595"/>
           </a:xfrm>
@@ -3112,14 +3152,14 @@
           <p:nvPr/>
         </p:nvPicPr>
         <p:blipFill>
-          <a:blip r:embed="rId2"/>
+          <a:blip r:embed="rId3"/>
           <a:stretch>
             <a:fillRect/>
           </a:stretch>
         </p:blipFill>
         <p:spPr>
           <a:xfrm>
-            <a:off x="233045" y="4733925"/>
+            <a:off x="225425" y="4733925"/>
             <a:ext cx="1538605" cy="951230"/>
           </a:xfrm>
           <a:prstGeom prst="rect">
@@ -3136,14 +3176,14 @@
           <p:nvPr/>
         </p:nvPicPr>
         <p:blipFill>
-          <a:blip r:embed="rId3"/>
+          <a:blip r:embed="rId4"/>
           <a:stretch>
             <a:fillRect/>
           </a:stretch>
         </p:blipFill>
         <p:spPr>
           <a:xfrm>
-            <a:off x="220345" y="3671570"/>
+            <a:off x="225425" y="3658235"/>
             <a:ext cx="1543050" cy="954405"/>
           </a:xfrm>
           <a:prstGeom prst="rect">
@@ -3160,30 +3200,6 @@
           <p:nvPr/>
         </p:nvPicPr>
         <p:blipFill>
-          <a:blip r:embed="rId4"/>
-          <a:stretch>
-            <a:fillRect/>
-          </a:stretch>
-        </p:blipFill>
-        <p:spPr>
-          <a:xfrm>
-            <a:off x="6443980" y="2578100"/>
-            <a:ext cx="2982595" cy="1843405"/>
-          </a:xfrm>
-          <a:prstGeom prst="rect">
-            <a:avLst/>
-          </a:prstGeom>
-        </p:spPr>
-      </p:pic>
-      <p:pic>
-        <p:nvPicPr>
-          <p:cNvPr id="109" name="Picture 108" descr="000054"/>
-          <p:cNvPicPr>
-            <a:picLocks noChangeAspect="1"/>
-          </p:cNvPicPr>
-          <p:nvPr/>
-        </p:nvPicPr>
-        <p:blipFill>
           <a:blip r:embed="rId5"/>
           <a:stretch>
             <a:fillRect/>
@@ -3191,8 +3207,8 @@
         </p:blipFill>
         <p:spPr>
           <a:xfrm>
-            <a:off x="224790" y="2519680"/>
-            <a:ext cx="1538605" cy="1037590"/>
+            <a:off x="6443980" y="2578100"/>
+            <a:ext cx="2982595" cy="1843405"/>
           </a:xfrm>
           <a:prstGeom prst="rect">
             <a:avLst/>
@@ -5005,8 +5021,8 @@
         </p:nvSpPr>
         <p:spPr>
           <a:xfrm>
-            <a:off x="7844155" y="3195320"/>
-            <a:ext cx="248285" cy="245110"/>
+            <a:off x="7823200" y="3163570"/>
+            <a:ext cx="512445" cy="245110"/>
           </a:xfrm>
           <a:prstGeom prst="rect">
             <a:avLst/>
@@ -5023,7 +5039,7 @@
                 <a:latin typeface="Arial Bold" panose="020B0604020202090204" charset="0"/>
                 <a:cs typeface="Arial Bold" panose="020B0604020202090204" charset="0"/>
               </a:rPr>
-              <a:t>U</a:t>
+              <a:t>mU</a:t>
             </a:r>
             <a:endParaRPr lang="en-US" sz="1000" b="1">
               <a:latin typeface="Arial Bold" panose="020B0604020202090204" charset="0"/>
@@ -7628,8 +7644,8 @@
         </p:nvSpPr>
         <p:spPr>
           <a:xfrm>
-            <a:off x="5372735" y="4689475"/>
-            <a:ext cx="186690" cy="245110"/>
+            <a:off x="5266690" y="4680585"/>
+            <a:ext cx="402590" cy="165735"/>
           </a:xfrm>
           <a:prstGeom prst="rect">
             <a:avLst/>
@@ -7638,13 +7654,13 @@
         </p:spPr>
         <p:txBody>
           <a:bodyPr wrap="square" rtlCol="0">
-            <a:spAutoFit/>
+            <a:noAutofit/>
           </a:bodyPr>
           <a:p>
             <a:pPr algn="ctr"/>
             <a:r>
               <a:rPr lang="en-US" sz="1000"/>
-              <a:t>U</a:t>
+              <a:t>mU</a:t>
             </a:r>
             <a:endParaRPr lang="en-US" sz="1000"/>
           </a:p>
@@ -10250,7 +10266,7 @@
             </a:r>
             <a:r>
               <a:rPr lang="en-US" sz="1100" b="1" i="1"/>
-              <a:t>UGCAUACG</a:t>
+              <a:t>UGCA(mU)ACG</a:t>
             </a:r>
             <a:endParaRPr lang="en-US" sz="1100" b="1" i="1"/>
           </a:p>

</xml_diff>